<commit_message>
use {{pptxSlides}} with extra ending
</commit_message>
<xml_diff>
--- a/test/slides.pptx
+++ b/test/slides.pptx
@@ -321,7 +321,7 @@
           <a:p>
             <a:fld id="{D2BF41B4-1A6C-4616-8220-02F5A017155F}" type="datetimeFigureOut">
               <a:rPr lang="en-US" smtClean="0"/>
-              <a:t>6/13/2019</a:t>
+              <a:t>7/4/2019</a:t>
             </a:fld>
             <a:endParaRPr lang="en-US"/>
           </a:p>
@@ -596,7 +596,7 @@
           <a:p>
             <a:fld id="{D2BF41B4-1A6C-4616-8220-02F5A017155F}" type="datetimeFigureOut">
               <a:rPr lang="en-US" smtClean="0"/>
-              <a:t>6/13/2019</a:t>
+              <a:t>7/4/2019</a:t>
             </a:fld>
             <a:endParaRPr lang="en-US"/>
           </a:p>
@@ -790,7 +790,7 @@
           <a:p>
             <a:fld id="{D2BF41B4-1A6C-4616-8220-02F5A017155F}" type="datetimeFigureOut">
               <a:rPr lang="en-US" smtClean="0"/>
-              <a:t>6/13/2019</a:t>
+              <a:t>7/4/2019</a:t>
             </a:fld>
             <a:endParaRPr lang="en-US"/>
           </a:p>
@@ -1063,7 +1063,7 @@
           <a:p>
             <a:fld id="{D2BF41B4-1A6C-4616-8220-02F5A017155F}" type="datetimeFigureOut">
               <a:rPr lang="en-US" smtClean="0"/>
-              <a:t>6/13/2019</a:t>
+              <a:t>7/4/2019</a:t>
             </a:fld>
             <a:endParaRPr lang="en-US"/>
           </a:p>
@@ -1404,7 +1404,7 @@
           <a:p>
             <a:fld id="{D2BF41B4-1A6C-4616-8220-02F5A017155F}" type="datetimeFigureOut">
               <a:rPr lang="en-US" smtClean="0"/>
-              <a:t>6/13/2019</a:t>
+              <a:t>7/4/2019</a:t>
             </a:fld>
             <a:endParaRPr lang="en-US"/>
           </a:p>
@@ -2027,7 +2027,7 @@
           <a:p>
             <a:fld id="{D2BF41B4-1A6C-4616-8220-02F5A017155F}" type="datetimeFigureOut">
               <a:rPr lang="en-US" smtClean="0"/>
-              <a:t>6/13/2019</a:t>
+              <a:t>7/4/2019</a:t>
             </a:fld>
             <a:endParaRPr lang="en-US"/>
           </a:p>
@@ -2887,7 +2887,7 @@
           <a:p>
             <a:fld id="{D2BF41B4-1A6C-4616-8220-02F5A017155F}" type="datetimeFigureOut">
               <a:rPr lang="en-US" smtClean="0"/>
-              <a:t>6/13/2019</a:t>
+              <a:t>7/4/2019</a:t>
             </a:fld>
             <a:endParaRPr lang="en-US"/>
           </a:p>
@@ -3057,7 +3057,7 @@
           <a:p>
             <a:fld id="{D2BF41B4-1A6C-4616-8220-02F5A017155F}" type="datetimeFigureOut">
               <a:rPr lang="en-US" smtClean="0"/>
-              <a:t>6/13/2019</a:t>
+              <a:t>7/4/2019</a:t>
             </a:fld>
             <a:endParaRPr lang="en-US"/>
           </a:p>
@@ -3237,7 +3237,7 @@
           <a:p>
             <a:fld id="{D2BF41B4-1A6C-4616-8220-02F5A017155F}" type="datetimeFigureOut">
               <a:rPr lang="en-US" smtClean="0"/>
-              <a:t>6/13/2019</a:t>
+              <a:t>7/4/2019</a:t>
             </a:fld>
             <a:endParaRPr lang="en-US"/>
           </a:p>
@@ -3407,7 +3407,7 @@
           <a:p>
             <a:fld id="{D2BF41B4-1A6C-4616-8220-02F5A017155F}" type="datetimeFigureOut">
               <a:rPr lang="en-US" smtClean="0"/>
-              <a:t>6/13/2019</a:t>
+              <a:t>7/4/2019</a:t>
             </a:fld>
             <a:endParaRPr lang="en-US"/>
           </a:p>
@@ -3654,7 +3654,7 @@
           <a:p>
             <a:fld id="{D2BF41B4-1A6C-4616-8220-02F5A017155F}" type="datetimeFigureOut">
               <a:rPr lang="en-US" smtClean="0"/>
-              <a:t>6/13/2019</a:t>
+              <a:t>7/4/2019</a:t>
             </a:fld>
             <a:endParaRPr lang="en-US"/>
           </a:p>
@@ -3946,7 +3946,7 @@
           <a:p>
             <a:fld id="{D2BF41B4-1A6C-4616-8220-02F5A017155F}" type="datetimeFigureOut">
               <a:rPr lang="en-US" smtClean="0"/>
-              <a:t>6/13/2019</a:t>
+              <a:t>7/4/2019</a:t>
             </a:fld>
             <a:endParaRPr lang="en-US"/>
           </a:p>
@@ -4390,7 +4390,7 @@
           <a:p>
             <a:fld id="{D2BF41B4-1A6C-4616-8220-02F5A017155F}" type="datetimeFigureOut">
               <a:rPr lang="en-US" smtClean="0"/>
-              <a:t>6/13/2019</a:t>
+              <a:t>7/4/2019</a:t>
             </a:fld>
             <a:endParaRPr lang="en-US"/>
           </a:p>
@@ -4508,7 +4508,7 @@
           <a:p>
             <a:fld id="{D2BF41B4-1A6C-4616-8220-02F5A017155F}" type="datetimeFigureOut">
               <a:rPr lang="en-US" smtClean="0"/>
-              <a:t>6/13/2019</a:t>
+              <a:t>7/4/2019</a:t>
             </a:fld>
             <a:endParaRPr lang="en-US"/>
           </a:p>
@@ -4603,7 +4603,7 @@
           <a:p>
             <a:fld id="{D2BF41B4-1A6C-4616-8220-02F5A017155F}" type="datetimeFigureOut">
               <a:rPr lang="en-US" smtClean="0"/>
-              <a:t>6/13/2019</a:t>
+              <a:t>7/4/2019</a:t>
             </a:fld>
             <a:endParaRPr lang="en-US"/>
           </a:p>
@@ -4882,7 +4882,7 @@
           <a:p>
             <a:fld id="{D2BF41B4-1A6C-4616-8220-02F5A017155F}" type="datetimeFigureOut">
               <a:rPr lang="en-US" smtClean="0"/>
-              <a:t>6/13/2019</a:t>
+              <a:t>7/4/2019</a:t>
             </a:fld>
             <a:endParaRPr lang="en-US"/>
           </a:p>
@@ -5157,7 +5157,7 @@
           <a:p>
             <a:fld id="{D2BF41B4-1A6C-4616-8220-02F5A017155F}" type="datetimeFigureOut">
               <a:rPr lang="en-US" smtClean="0"/>
-              <a:t>6/13/2019</a:t>
+              <a:t>7/4/2019</a:t>
             </a:fld>
             <a:endParaRPr lang="en-US"/>
           </a:p>
@@ -5586,7 +5586,7 @@
           <a:p>
             <a:fld id="{D2BF41B4-1A6C-4616-8220-02F5A017155F}" type="datetimeFigureOut">
               <a:rPr lang="en-US" smtClean="0"/>
-              <a:t>6/13/2019</a:t>
+              <a:t>7/4/2019</a:t>
             </a:fld>
             <a:endParaRPr lang="en-US"/>
           </a:p>
@@ -6170,13 +6170,13 @@
   <p:clrMapOvr>
     <a:masterClrMapping/>
   </p:clrMapOvr>
-  <mc:AlternateContent xmlns:mc="http://schemas.openxmlformats.org/markup-compatibility/2006">
-    <mc:Choice xmlns:p14="http://schemas.microsoft.com/office/powerpoint/2010/main" Requires="p14">
+  <mc:AlternateContent xmlns:mc="http://schemas.openxmlformats.org/markup-compatibility/2006" xmlns:p14="http://schemas.microsoft.com/office/powerpoint/2010/main">
+    <mc:Choice Requires="p14">
       <p:transition spd="slow" p14:dur="800">
         <p:circle/>
       </p:transition>
     </mc:Choice>
-    <mc:Fallback>
+    <mc:Fallback xmlns="">
       <p:transition spd="slow">
         <p:circle/>
       </p:transition>
@@ -6305,7 +6305,7 @@
           <a:p>
             <a:r>
               <a:rPr lang="en-US" dirty="0" smtClean="0"/>
-              <a:t>{{#</a:t>
+              <a:t>{{</a:t>
             </a:r>
             <a:r>
               <a:rPr lang="en-US" dirty="0" err="1" smtClean="0"/>
@@ -6313,11 +6313,11 @@
             </a:r>
             <a:r>
               <a:rPr lang="en-US" dirty="0" smtClean="0"/>
-              <a:t> items}}{{/</a:t>
-            </a:r>
-            <a:r>
-              <a:rPr lang="en-US" dirty="0" err="1" smtClean="0"/>
-              <a:t>pptxSlides</a:t>
+              <a:t> </a:t>
+            </a:r>
+            <a:r>
+              <a:rPr lang="en-US" dirty="0" smtClean="0"/>
+              <a:t>items</a:t>
             </a:r>
             <a:r>
               <a:rPr lang="en-US" dirty="0" smtClean="0"/>
@@ -6337,13 +6337,13 @@
   <p:clrMapOvr>
     <a:masterClrMapping/>
   </p:clrMapOvr>
-  <mc:AlternateContent xmlns:mc="http://schemas.openxmlformats.org/markup-compatibility/2006">
-    <mc:Choice xmlns:p15="http://schemas.microsoft.com/office/powerpoint/2012/main" Requires="p15">
+  <mc:AlternateContent xmlns:mc="http://schemas.openxmlformats.org/markup-compatibility/2006" xmlns:p15="http://schemas.microsoft.com/office/powerpoint/2012/main">
+    <mc:Choice Requires="p15">
       <p:transition xmlns:p14="http://schemas.microsoft.com/office/powerpoint/2010/main" spd="slow" p14:dur="2000">
         <p15:prstTrans prst="fallOver"/>
       </p:transition>
     </mc:Choice>
-    <mc:Fallback>
+    <mc:Fallback xmlns="">
       <p:transition spd="slow">
         <p:fade/>
       </p:transition>

</xml_diff>

<commit_message>
fix pptxSlides slides positioning
</commit_message>
<xml_diff>
--- a/test/slides.pptx
+++ b/test/slides.pptx
@@ -7,6 +7,7 @@
   <p:sldIdLst>
     <p:sldId id="257" r:id="rId2"/>
     <p:sldId id="256" r:id="rId3"/>
+    <p:sldId id="258" r:id="rId4"/>
   </p:sldIdLst>
   <p:sldSz cx="12192000" cy="6858000"/>
   <p:notesSz cx="6858000" cy="9144000"/>
@@ -112,6 +113,7 @@
           <p14:sldIdLst>
             <p14:sldId id="257"/>
             <p14:sldId id="256"/>
+            <p14:sldId id="258"/>
           </p14:sldIdLst>
         </p14:section>
       </p14:sectionLst>
@@ -177,7 +179,7 @@
           </a:lstStyle>
           <a:p>
             <a:r>
-              <a:rPr lang="en-US" smtClean="0"/>
+              <a:rPr lang="en-US"/>
               <a:t>Click to edit Master title style</a:t>
             </a:r>
             <a:endParaRPr lang="en-US" dirty="0"/>
@@ -297,7 +299,7 @@
           </a:lstStyle>
           <a:p>
             <a:r>
-              <a:rPr lang="en-US" smtClean="0"/>
+              <a:rPr lang="en-US"/>
               <a:t>Click to edit Master subtitle style</a:t>
             </a:r>
             <a:endParaRPr lang="en-US" dirty="0"/>
@@ -321,7 +323,7 @@
           <a:p>
             <a:fld id="{D2BF41B4-1A6C-4616-8220-02F5A017155F}" type="datetimeFigureOut">
               <a:rPr lang="en-US" smtClean="0"/>
-              <a:t>7/4/2019</a:t>
+              <a:t>3/31/2021</a:t>
             </a:fld>
             <a:endParaRPr lang="en-US"/>
           </a:p>
@@ -426,7 +428,7 @@
           </a:lstStyle>
           <a:p>
             <a:r>
-              <a:rPr lang="en-US" smtClean="0"/>
+              <a:rPr lang="en-US"/>
               <a:t>Click to edit Master title style</a:t>
             </a:r>
             <a:endParaRPr lang="en-US" dirty="0"/>
@@ -505,7 +507,7 @@
           </a:lstStyle>
           <a:p>
             <a:r>
-              <a:rPr lang="en-US" smtClean="0"/>
+              <a:rPr lang="en-US"/>
               <a:t>Click icon to add picture</a:t>
             </a:r>
             <a:endParaRPr lang="en-US" dirty="0"/>
@@ -573,7 +575,7 @@
           <a:p>
             <a:pPr lvl="0"/>
             <a:r>
-              <a:rPr lang="en-US" smtClean="0"/>
+              <a:rPr lang="en-US"/>
               <a:t>Click to edit Master text styles</a:t>
             </a:r>
           </a:p>
@@ -596,7 +598,7 @@
           <a:p>
             <a:fld id="{D2BF41B4-1A6C-4616-8220-02F5A017155F}" type="datetimeFigureOut">
               <a:rPr lang="en-US" smtClean="0"/>
-              <a:t>7/4/2019</a:t>
+              <a:t>3/31/2021</a:t>
             </a:fld>
             <a:endParaRPr lang="en-US"/>
           </a:p>
@@ -699,7 +701,7 @@
           </a:lstStyle>
           <a:p>
             <a:r>
-              <a:rPr lang="en-US" smtClean="0"/>
+              <a:rPr lang="en-US"/>
               <a:t>Click to edit Master title style</a:t>
             </a:r>
             <a:endParaRPr lang="en-US" dirty="0"/>
@@ -767,7 +769,7 @@
           <a:p>
             <a:pPr lvl="0"/>
             <a:r>
-              <a:rPr lang="en-US" smtClean="0"/>
+              <a:rPr lang="en-US"/>
               <a:t>Click to edit Master text styles</a:t>
             </a:r>
           </a:p>
@@ -790,7 +792,7 @@
           <a:p>
             <a:fld id="{D2BF41B4-1A6C-4616-8220-02F5A017155F}" type="datetimeFigureOut">
               <a:rPr lang="en-US" smtClean="0"/>
-              <a:t>7/4/2019</a:t>
+              <a:t>3/31/2021</a:t>
             </a:fld>
             <a:endParaRPr lang="en-US"/>
           </a:p>
@@ -893,7 +895,7 @@
           </a:lstStyle>
           <a:p>
             <a:r>
-              <a:rPr lang="en-US" smtClean="0"/>
+              <a:rPr lang="en-US"/>
               <a:t>Click to edit Master title style</a:t>
             </a:r>
             <a:endParaRPr lang="en-US" dirty="0"/>
@@ -973,7 +975,7 @@
               <a:buNone/>
             </a:pPr>
             <a:r>
-              <a:rPr lang="en-US" smtClean="0"/>
+              <a:rPr lang="en-US"/>
               <a:t>Click to edit Master text styles</a:t>
             </a:r>
           </a:p>
@@ -1040,7 +1042,7 @@
           <a:p>
             <a:pPr lvl="0"/>
             <a:r>
-              <a:rPr lang="en-US" smtClean="0"/>
+              <a:rPr lang="en-US"/>
               <a:t>Click to edit Master text styles</a:t>
             </a:r>
           </a:p>
@@ -1063,7 +1065,7 @@
           <a:p>
             <a:fld id="{D2BF41B4-1A6C-4616-8220-02F5A017155F}" type="datetimeFigureOut">
               <a:rPr lang="en-US" smtClean="0"/>
-              <a:t>7/4/2019</a:t>
+              <a:t>3/31/2021</a:t>
             </a:fld>
             <a:endParaRPr lang="en-US"/>
           </a:p>
@@ -1260,7 +1262,7 @@
           </a:lstStyle>
           <a:p>
             <a:r>
-              <a:rPr lang="en-US" smtClean="0"/>
+              <a:rPr lang="en-US"/>
               <a:t>Click to edit Master title style</a:t>
             </a:r>
             <a:endParaRPr lang="en-US" dirty="0"/>
@@ -1381,7 +1383,7 @@
           <a:p>
             <a:pPr lvl="0"/>
             <a:r>
-              <a:rPr lang="en-US" smtClean="0"/>
+              <a:rPr lang="en-US"/>
               <a:t>Click to edit Master text styles</a:t>
             </a:r>
           </a:p>
@@ -1404,7 +1406,7 @@
           <a:p>
             <a:fld id="{D2BF41B4-1A6C-4616-8220-02F5A017155F}" type="datetimeFigureOut">
               <a:rPr lang="en-US" smtClean="0"/>
-              <a:t>7/4/2019</a:t>
+              <a:t>3/31/2021</a:t>
             </a:fld>
             <a:endParaRPr lang="en-US"/>
           </a:p>
@@ -1502,7 +1504,7 @@
           </a:lstStyle>
           <a:p>
             <a:r>
-              <a:rPr lang="en-US" smtClean="0"/>
+              <a:rPr lang="en-US"/>
               <a:t>Click to edit Master title style</a:t>
             </a:r>
             <a:endParaRPr lang="en-US" dirty="0"/>
@@ -1577,7 +1579,7 @@
           <a:p>
             <a:pPr lvl="0"/>
             <a:r>
-              <a:rPr lang="en-US" smtClean="0"/>
+              <a:rPr lang="en-US"/>
               <a:t>Click to edit Master text styles</a:t>
             </a:r>
           </a:p>
@@ -1644,7 +1646,7 @@
           <a:p>
             <a:pPr lvl="0"/>
             <a:r>
-              <a:rPr lang="en-US" smtClean="0"/>
+              <a:rPr lang="en-US"/>
               <a:t>Click to edit Master text styles</a:t>
             </a:r>
           </a:p>
@@ -1718,7 +1720,7 @@
           <a:p>
             <a:pPr lvl="0"/>
             <a:r>
-              <a:rPr lang="en-US" smtClean="0"/>
+              <a:rPr lang="en-US"/>
               <a:t>Click to edit Master text styles</a:t>
             </a:r>
           </a:p>
@@ -1785,7 +1787,7 @@
           <a:p>
             <a:pPr lvl="0"/>
             <a:r>
-              <a:rPr lang="en-US" smtClean="0"/>
+              <a:rPr lang="en-US"/>
               <a:t>Click to edit Master text styles</a:t>
             </a:r>
           </a:p>
@@ -1859,7 +1861,7 @@
           <a:p>
             <a:pPr lvl="0"/>
             <a:r>
-              <a:rPr lang="en-US" smtClean="0"/>
+              <a:rPr lang="en-US"/>
               <a:t>Click to edit Master text styles</a:t>
             </a:r>
           </a:p>
@@ -1926,7 +1928,7 @@
           <a:p>
             <a:pPr lvl="0"/>
             <a:r>
-              <a:rPr lang="en-US" smtClean="0"/>
+              <a:rPr lang="en-US"/>
               <a:t>Click to edit Master text styles</a:t>
             </a:r>
           </a:p>
@@ -2027,7 +2029,7 @@
           <a:p>
             <a:fld id="{D2BF41B4-1A6C-4616-8220-02F5A017155F}" type="datetimeFigureOut">
               <a:rPr lang="en-US" smtClean="0"/>
-              <a:t>7/4/2019</a:t>
+              <a:t>3/31/2021</a:t>
             </a:fld>
             <a:endParaRPr lang="en-US"/>
           </a:p>
@@ -2125,7 +2127,7 @@
           </a:lstStyle>
           <a:p>
             <a:r>
-              <a:rPr lang="en-US" smtClean="0"/>
+              <a:rPr lang="en-US"/>
               <a:t>Click to edit Master title style</a:t>
             </a:r>
             <a:endParaRPr lang="en-US" dirty="0"/>
@@ -2200,7 +2202,7 @@
           <a:p>
             <a:pPr lvl="0"/>
             <a:r>
-              <a:rPr lang="en-US" smtClean="0"/>
+              <a:rPr lang="en-US"/>
               <a:t>Click to edit Master text styles</a:t>
             </a:r>
           </a:p>
@@ -2278,7 +2280,7 @@
           </a:lstStyle>
           <a:p>
             <a:r>
-              <a:rPr lang="en-US" smtClean="0"/>
+              <a:rPr lang="en-US"/>
               <a:t>Click icon to add picture</a:t>
             </a:r>
             <a:endParaRPr lang="en-US" dirty="0"/>
@@ -2346,7 +2348,7 @@
           <a:p>
             <a:pPr lvl="0"/>
             <a:r>
-              <a:rPr lang="en-US" smtClean="0"/>
+              <a:rPr lang="en-US"/>
               <a:t>Click to edit Master text styles</a:t>
             </a:r>
           </a:p>
@@ -2420,7 +2422,7 @@
           <a:p>
             <a:pPr lvl="0"/>
             <a:r>
-              <a:rPr lang="en-US" smtClean="0"/>
+              <a:rPr lang="en-US"/>
               <a:t>Click to edit Master text styles</a:t>
             </a:r>
           </a:p>
@@ -2498,7 +2500,7 @@
           </a:lstStyle>
           <a:p>
             <a:r>
-              <a:rPr lang="en-US" smtClean="0"/>
+              <a:rPr lang="en-US"/>
               <a:t>Click icon to add picture</a:t>
             </a:r>
             <a:endParaRPr lang="en-US" dirty="0"/>
@@ -2566,7 +2568,7 @@
           <a:p>
             <a:pPr lvl="0"/>
             <a:r>
-              <a:rPr lang="en-US" smtClean="0"/>
+              <a:rPr lang="en-US"/>
               <a:t>Click to edit Master text styles</a:t>
             </a:r>
           </a:p>
@@ -2640,7 +2642,7 @@
           <a:p>
             <a:pPr lvl="0"/>
             <a:r>
-              <a:rPr lang="en-US" smtClean="0"/>
+              <a:rPr lang="en-US"/>
               <a:t>Click to edit Master text styles</a:t>
             </a:r>
           </a:p>
@@ -2718,7 +2720,7 @@
           </a:lstStyle>
           <a:p>
             <a:r>
-              <a:rPr lang="en-US" smtClean="0"/>
+              <a:rPr lang="en-US"/>
               <a:t>Click icon to add picture</a:t>
             </a:r>
             <a:endParaRPr lang="en-US" dirty="0"/>
@@ -2786,7 +2788,7 @@
           <a:p>
             <a:pPr lvl="0"/>
             <a:r>
-              <a:rPr lang="en-US" smtClean="0"/>
+              <a:rPr lang="en-US"/>
               <a:t>Click to edit Master text styles</a:t>
             </a:r>
           </a:p>
@@ -2887,7 +2889,7 @@
           <a:p>
             <a:fld id="{D2BF41B4-1A6C-4616-8220-02F5A017155F}" type="datetimeFigureOut">
               <a:rPr lang="en-US" smtClean="0"/>
-              <a:t>7/4/2019</a:t>
+              <a:t>3/31/2021</a:t>
             </a:fld>
             <a:endParaRPr lang="en-US"/>
           </a:p>
@@ -2981,7 +2983,7 @@
           <a:lstStyle/>
           <a:p>
             <a:r>
-              <a:rPr lang="en-US" smtClean="0"/>
+              <a:rPr lang="en-US"/>
               <a:t>Click to edit Master title style</a:t>
             </a:r>
             <a:endParaRPr lang="en-US" dirty="0"/>
@@ -3005,35 +3007,35 @@
           <a:p>
             <a:pPr lvl="0"/>
             <a:r>
-              <a:rPr lang="en-US" smtClean="0"/>
+              <a:rPr lang="en-US"/>
               <a:t>Click to edit Master text styles</a:t>
             </a:r>
           </a:p>
           <a:p>
             <a:pPr lvl="1"/>
             <a:r>
-              <a:rPr lang="en-US" smtClean="0"/>
+              <a:rPr lang="en-US"/>
               <a:t>Second level</a:t>
             </a:r>
           </a:p>
           <a:p>
             <a:pPr lvl="2"/>
             <a:r>
-              <a:rPr lang="en-US" smtClean="0"/>
+              <a:rPr lang="en-US"/>
               <a:t>Third level</a:t>
             </a:r>
           </a:p>
           <a:p>
             <a:pPr lvl="3"/>
             <a:r>
-              <a:rPr lang="en-US" smtClean="0"/>
+              <a:rPr lang="en-US"/>
               <a:t>Fourth level</a:t>
             </a:r>
           </a:p>
           <a:p>
             <a:pPr lvl="4"/>
             <a:r>
-              <a:rPr lang="en-US" smtClean="0"/>
+              <a:rPr lang="en-US"/>
               <a:t>Fifth level</a:t>
             </a:r>
             <a:endParaRPr lang="en-US" dirty="0"/>
@@ -3057,7 +3059,7 @@
           <a:p>
             <a:fld id="{D2BF41B4-1A6C-4616-8220-02F5A017155F}" type="datetimeFigureOut">
               <a:rPr lang="en-US" smtClean="0"/>
-              <a:t>7/4/2019</a:t>
+              <a:t>3/31/2021</a:t>
             </a:fld>
             <a:endParaRPr lang="en-US"/>
           </a:p>
@@ -3156,7 +3158,7 @@
           <a:lstStyle/>
           <a:p>
             <a:r>
-              <a:rPr lang="en-US" smtClean="0"/>
+              <a:rPr lang="en-US"/>
               <a:t>Click to edit Master title style</a:t>
             </a:r>
             <a:endParaRPr lang="en-US" dirty="0"/>
@@ -3185,35 +3187,35 @@
           <a:p>
             <a:pPr lvl="0"/>
             <a:r>
-              <a:rPr lang="en-US" smtClean="0"/>
+              <a:rPr lang="en-US"/>
               <a:t>Click to edit Master text styles</a:t>
             </a:r>
           </a:p>
           <a:p>
             <a:pPr lvl="1"/>
             <a:r>
-              <a:rPr lang="en-US" smtClean="0"/>
+              <a:rPr lang="en-US"/>
               <a:t>Second level</a:t>
             </a:r>
           </a:p>
           <a:p>
             <a:pPr lvl="2"/>
             <a:r>
-              <a:rPr lang="en-US" smtClean="0"/>
+              <a:rPr lang="en-US"/>
               <a:t>Third level</a:t>
             </a:r>
           </a:p>
           <a:p>
             <a:pPr lvl="3"/>
             <a:r>
-              <a:rPr lang="en-US" smtClean="0"/>
+              <a:rPr lang="en-US"/>
               <a:t>Fourth level</a:t>
             </a:r>
           </a:p>
           <a:p>
             <a:pPr lvl="4"/>
             <a:r>
-              <a:rPr lang="en-US" smtClean="0"/>
+              <a:rPr lang="en-US"/>
               <a:t>Fifth level</a:t>
             </a:r>
             <a:endParaRPr lang="en-US" dirty="0"/>
@@ -3237,7 +3239,7 @@
           <a:p>
             <a:fld id="{D2BF41B4-1A6C-4616-8220-02F5A017155F}" type="datetimeFigureOut">
               <a:rPr lang="en-US" smtClean="0"/>
-              <a:t>7/4/2019</a:t>
+              <a:t>3/31/2021</a:t>
             </a:fld>
             <a:endParaRPr lang="en-US"/>
           </a:p>
@@ -3331,7 +3333,7 @@
           <a:lstStyle/>
           <a:p>
             <a:r>
-              <a:rPr lang="en-US" smtClean="0"/>
+              <a:rPr lang="en-US"/>
               <a:t>Click to edit Master title style</a:t>
             </a:r>
             <a:endParaRPr lang="en-US" dirty="0"/>
@@ -3355,35 +3357,35 @@
           <a:p>
             <a:pPr lvl="0"/>
             <a:r>
-              <a:rPr lang="en-US" smtClean="0"/>
+              <a:rPr lang="en-US"/>
               <a:t>Click to edit Master text styles</a:t>
             </a:r>
           </a:p>
           <a:p>
             <a:pPr lvl="1"/>
             <a:r>
-              <a:rPr lang="en-US" smtClean="0"/>
+              <a:rPr lang="en-US"/>
               <a:t>Second level</a:t>
             </a:r>
           </a:p>
           <a:p>
             <a:pPr lvl="2"/>
             <a:r>
-              <a:rPr lang="en-US" smtClean="0"/>
+              <a:rPr lang="en-US"/>
               <a:t>Third level</a:t>
             </a:r>
           </a:p>
           <a:p>
             <a:pPr lvl="3"/>
             <a:r>
-              <a:rPr lang="en-US" smtClean="0"/>
+              <a:rPr lang="en-US"/>
               <a:t>Fourth level</a:t>
             </a:r>
           </a:p>
           <a:p>
             <a:pPr lvl="4"/>
             <a:r>
-              <a:rPr lang="en-US" smtClean="0"/>
+              <a:rPr lang="en-US"/>
               <a:t>Fifth level</a:t>
             </a:r>
             <a:endParaRPr lang="en-US" dirty="0"/>
@@ -3407,7 +3409,7 @@
           <a:p>
             <a:fld id="{D2BF41B4-1A6C-4616-8220-02F5A017155F}" type="datetimeFigureOut">
               <a:rPr lang="en-US" smtClean="0"/>
-              <a:t>7/4/2019</a:t>
+              <a:t>3/31/2021</a:t>
             </a:fld>
             <a:endParaRPr lang="en-US"/>
           </a:p>
@@ -3510,7 +3512,7 @@
           </a:lstStyle>
           <a:p>
             <a:r>
-              <a:rPr lang="en-US" smtClean="0"/>
+              <a:rPr lang="en-US"/>
               <a:t>Click to edit Master title style</a:t>
             </a:r>
             <a:endParaRPr lang="en-US" dirty="0"/>
@@ -3631,7 +3633,7 @@
           <a:p>
             <a:pPr lvl="0"/>
             <a:r>
-              <a:rPr lang="en-US" smtClean="0"/>
+              <a:rPr lang="en-US"/>
               <a:t>Click to edit Master text styles</a:t>
             </a:r>
           </a:p>
@@ -3654,7 +3656,7 @@
           <a:p>
             <a:fld id="{D2BF41B4-1A6C-4616-8220-02F5A017155F}" type="datetimeFigureOut">
               <a:rPr lang="en-US" smtClean="0"/>
-              <a:t>7/4/2019</a:t>
+              <a:t>3/31/2021</a:t>
             </a:fld>
             <a:endParaRPr lang="en-US"/>
           </a:p>
@@ -3748,7 +3750,7 @@
           <a:lstStyle/>
           <a:p>
             <a:r>
-              <a:rPr lang="en-US" smtClean="0"/>
+              <a:rPr lang="en-US"/>
               <a:t>Click to edit Master title style</a:t>
             </a:r>
             <a:endParaRPr lang="en-US" dirty="0"/>
@@ -3807,35 +3809,35 @@
           <a:p>
             <a:pPr lvl="0"/>
             <a:r>
-              <a:rPr lang="en-US" smtClean="0"/>
+              <a:rPr lang="en-US"/>
               <a:t>Click to edit Master text styles</a:t>
             </a:r>
           </a:p>
           <a:p>
             <a:pPr lvl="1"/>
             <a:r>
-              <a:rPr lang="en-US" smtClean="0"/>
+              <a:rPr lang="en-US"/>
               <a:t>Second level</a:t>
             </a:r>
           </a:p>
           <a:p>
             <a:pPr lvl="2"/>
             <a:r>
-              <a:rPr lang="en-US" smtClean="0"/>
+              <a:rPr lang="en-US"/>
               <a:t>Third level</a:t>
             </a:r>
           </a:p>
           <a:p>
             <a:pPr lvl="3"/>
             <a:r>
-              <a:rPr lang="en-US" smtClean="0"/>
+              <a:rPr lang="en-US"/>
               <a:t>Fourth level</a:t>
             </a:r>
           </a:p>
           <a:p>
             <a:pPr lvl="4"/>
             <a:r>
-              <a:rPr lang="en-US" smtClean="0"/>
+              <a:rPr lang="en-US"/>
               <a:t>Fifth level</a:t>
             </a:r>
             <a:endParaRPr lang="en-US" dirty="0"/>
@@ -3894,35 +3896,35 @@
           <a:p>
             <a:pPr lvl="0"/>
             <a:r>
-              <a:rPr lang="en-US" smtClean="0"/>
+              <a:rPr lang="en-US"/>
               <a:t>Click to edit Master text styles</a:t>
             </a:r>
           </a:p>
           <a:p>
             <a:pPr lvl="1"/>
             <a:r>
-              <a:rPr lang="en-US" smtClean="0"/>
+              <a:rPr lang="en-US"/>
               <a:t>Second level</a:t>
             </a:r>
           </a:p>
           <a:p>
             <a:pPr lvl="2"/>
             <a:r>
-              <a:rPr lang="en-US" smtClean="0"/>
+              <a:rPr lang="en-US"/>
               <a:t>Third level</a:t>
             </a:r>
           </a:p>
           <a:p>
             <a:pPr lvl="3"/>
             <a:r>
-              <a:rPr lang="en-US" smtClean="0"/>
+              <a:rPr lang="en-US"/>
               <a:t>Fourth level</a:t>
             </a:r>
           </a:p>
           <a:p>
             <a:pPr lvl="4"/>
             <a:r>
-              <a:rPr lang="en-US" smtClean="0"/>
+              <a:rPr lang="en-US"/>
               <a:t>Fifth level</a:t>
             </a:r>
             <a:endParaRPr lang="en-US" dirty="0"/>
@@ -3946,7 +3948,7 @@
           <a:p>
             <a:fld id="{D2BF41B4-1A6C-4616-8220-02F5A017155F}" type="datetimeFigureOut">
               <a:rPr lang="en-US" smtClean="0"/>
-              <a:t>7/4/2019</a:t>
+              <a:t>3/31/2021</a:t>
             </a:fld>
             <a:endParaRPr lang="en-US"/>
           </a:p>
@@ -4044,7 +4046,7 @@
           </a:lstStyle>
           <a:p>
             <a:r>
-              <a:rPr lang="en-US" smtClean="0"/>
+              <a:rPr lang="en-US"/>
               <a:t>Click to edit Master title style</a:t>
             </a:r>
             <a:endParaRPr lang="en-US" dirty="0"/>
@@ -4119,7 +4121,7 @@
           <a:p>
             <a:pPr lvl="0"/>
             <a:r>
-              <a:rPr lang="en-US" smtClean="0"/>
+              <a:rPr lang="en-US"/>
               <a:t>Click to edit Master text styles</a:t>
             </a:r>
           </a:p>
@@ -4177,35 +4179,35 @@
           <a:p>
             <a:pPr lvl="0"/>
             <a:r>
-              <a:rPr lang="en-US" smtClean="0"/>
+              <a:rPr lang="en-US"/>
               <a:t>Click to edit Master text styles</a:t>
             </a:r>
           </a:p>
           <a:p>
             <a:pPr lvl="1"/>
             <a:r>
-              <a:rPr lang="en-US" smtClean="0"/>
+              <a:rPr lang="en-US"/>
               <a:t>Second level</a:t>
             </a:r>
           </a:p>
           <a:p>
             <a:pPr lvl="2"/>
             <a:r>
-              <a:rPr lang="en-US" smtClean="0"/>
+              <a:rPr lang="en-US"/>
               <a:t>Third level</a:t>
             </a:r>
           </a:p>
           <a:p>
             <a:pPr lvl="3"/>
             <a:r>
-              <a:rPr lang="en-US" smtClean="0"/>
+              <a:rPr lang="en-US"/>
               <a:t>Fourth level</a:t>
             </a:r>
           </a:p>
           <a:p>
             <a:pPr lvl="4"/>
             <a:r>
-              <a:rPr lang="en-US" smtClean="0"/>
+              <a:rPr lang="en-US"/>
               <a:t>Fifth level</a:t>
             </a:r>
             <a:endParaRPr lang="en-US" dirty="0"/>
@@ -4280,7 +4282,7 @@
           <a:p>
             <a:pPr lvl="0"/>
             <a:r>
-              <a:rPr lang="en-US" smtClean="0"/>
+              <a:rPr lang="en-US"/>
               <a:t>Click to edit Master text styles</a:t>
             </a:r>
           </a:p>
@@ -4338,35 +4340,35 @@
           <a:p>
             <a:pPr lvl="0"/>
             <a:r>
-              <a:rPr lang="en-US" smtClean="0"/>
+              <a:rPr lang="en-US"/>
               <a:t>Click to edit Master text styles</a:t>
             </a:r>
           </a:p>
           <a:p>
             <a:pPr lvl="1"/>
             <a:r>
-              <a:rPr lang="en-US" smtClean="0"/>
+              <a:rPr lang="en-US"/>
               <a:t>Second level</a:t>
             </a:r>
           </a:p>
           <a:p>
             <a:pPr lvl="2"/>
             <a:r>
-              <a:rPr lang="en-US" smtClean="0"/>
+              <a:rPr lang="en-US"/>
               <a:t>Third level</a:t>
             </a:r>
           </a:p>
           <a:p>
             <a:pPr lvl="3"/>
             <a:r>
-              <a:rPr lang="en-US" smtClean="0"/>
+              <a:rPr lang="en-US"/>
               <a:t>Fourth level</a:t>
             </a:r>
           </a:p>
           <a:p>
             <a:pPr lvl="4"/>
             <a:r>
-              <a:rPr lang="en-US" smtClean="0"/>
+              <a:rPr lang="en-US"/>
               <a:t>Fifth level</a:t>
             </a:r>
             <a:endParaRPr lang="en-US" dirty="0"/>
@@ -4390,7 +4392,7 @@
           <a:p>
             <a:fld id="{D2BF41B4-1A6C-4616-8220-02F5A017155F}" type="datetimeFigureOut">
               <a:rPr lang="en-US" smtClean="0"/>
-              <a:t>7/4/2019</a:t>
+              <a:t>3/31/2021</a:t>
             </a:fld>
             <a:endParaRPr lang="en-US"/>
           </a:p>
@@ -4484,7 +4486,7 @@
           <a:lstStyle/>
           <a:p>
             <a:r>
-              <a:rPr lang="en-US" smtClean="0"/>
+              <a:rPr lang="en-US"/>
               <a:t>Click to edit Master title style</a:t>
             </a:r>
             <a:endParaRPr lang="en-US" dirty="0"/>
@@ -4508,7 +4510,7 @@
           <a:p>
             <a:fld id="{D2BF41B4-1A6C-4616-8220-02F5A017155F}" type="datetimeFigureOut">
               <a:rPr lang="en-US" smtClean="0"/>
-              <a:t>7/4/2019</a:t>
+              <a:t>3/31/2021</a:t>
             </a:fld>
             <a:endParaRPr lang="en-US"/>
           </a:p>
@@ -4603,7 +4605,7 @@
           <a:p>
             <a:fld id="{D2BF41B4-1A6C-4616-8220-02F5A017155F}" type="datetimeFigureOut">
               <a:rPr lang="en-US" smtClean="0"/>
-              <a:t>7/4/2019</a:t>
+              <a:t>3/31/2021</a:t>
             </a:fld>
             <a:endParaRPr lang="en-US"/>
           </a:p>
@@ -4706,7 +4708,7 @@
           </a:lstStyle>
           <a:p>
             <a:r>
-              <a:rPr lang="en-US" smtClean="0"/>
+              <a:rPr lang="en-US"/>
               <a:t>Click to edit Master title style</a:t>
             </a:r>
             <a:endParaRPr lang="en-US" dirty="0"/>
@@ -4765,35 +4767,35 @@
           <a:p>
             <a:pPr lvl="0"/>
             <a:r>
-              <a:rPr lang="en-US" smtClean="0"/>
+              <a:rPr lang="en-US"/>
               <a:t>Click to edit Master text styles</a:t>
             </a:r>
           </a:p>
           <a:p>
             <a:pPr lvl="1"/>
             <a:r>
-              <a:rPr lang="en-US" smtClean="0"/>
+              <a:rPr lang="en-US"/>
               <a:t>Second level</a:t>
             </a:r>
           </a:p>
           <a:p>
             <a:pPr lvl="2"/>
             <a:r>
-              <a:rPr lang="en-US" smtClean="0"/>
+              <a:rPr lang="en-US"/>
               <a:t>Third level</a:t>
             </a:r>
           </a:p>
           <a:p>
             <a:pPr lvl="3"/>
             <a:r>
-              <a:rPr lang="en-US" smtClean="0"/>
+              <a:rPr lang="en-US"/>
               <a:t>Fourth level</a:t>
             </a:r>
           </a:p>
           <a:p>
             <a:pPr lvl="4"/>
             <a:r>
-              <a:rPr lang="en-US" smtClean="0"/>
+              <a:rPr lang="en-US"/>
               <a:t>Fifth level</a:t>
             </a:r>
             <a:endParaRPr lang="en-US" dirty="0"/>
@@ -4859,7 +4861,7 @@
           <a:p>
             <a:pPr lvl="0"/>
             <a:r>
-              <a:rPr lang="en-US" smtClean="0"/>
+              <a:rPr lang="en-US"/>
               <a:t>Click to edit Master text styles</a:t>
             </a:r>
           </a:p>
@@ -4882,7 +4884,7 @@
           <a:p>
             <a:fld id="{D2BF41B4-1A6C-4616-8220-02F5A017155F}" type="datetimeFigureOut">
               <a:rPr lang="en-US" smtClean="0"/>
-              <a:t>7/4/2019</a:t>
+              <a:t>3/31/2021</a:t>
             </a:fld>
             <a:endParaRPr lang="en-US"/>
           </a:p>
@@ -4987,7 +4989,7 @@
           </a:lstStyle>
           <a:p>
             <a:r>
-              <a:rPr lang="en-US" smtClean="0"/>
+              <a:rPr lang="en-US"/>
               <a:t>Click to edit Master title style</a:t>
             </a:r>
             <a:endParaRPr lang="en-US" dirty="0"/>
@@ -5066,7 +5068,7 @@
           </a:lstStyle>
           <a:p>
             <a:r>
-              <a:rPr lang="en-US" smtClean="0"/>
+              <a:rPr lang="en-US"/>
               <a:t>Click icon to add picture</a:t>
             </a:r>
             <a:endParaRPr lang="en-US" dirty="0"/>
@@ -5134,7 +5136,7 @@
           <a:p>
             <a:pPr lvl="0"/>
             <a:r>
-              <a:rPr lang="en-US" smtClean="0"/>
+              <a:rPr lang="en-US"/>
               <a:t>Click to edit Master text styles</a:t>
             </a:r>
           </a:p>
@@ -5157,7 +5159,7 @@
           <a:p>
             <a:fld id="{D2BF41B4-1A6C-4616-8220-02F5A017155F}" type="datetimeFigureOut">
               <a:rPr lang="en-US" smtClean="0"/>
-              <a:t>7/4/2019</a:t>
+              <a:t>3/31/2021</a:t>
             </a:fld>
             <a:endParaRPr lang="en-US"/>
           </a:p>
@@ -5481,7 +5483,7 @@
           <a:lstStyle/>
           <a:p>
             <a:r>
-              <a:rPr lang="en-US" smtClean="0"/>
+              <a:rPr lang="en-US"/>
               <a:t>Click to edit Master title style</a:t>
             </a:r>
             <a:endParaRPr lang="en-US" dirty="0"/>
@@ -5515,35 +5517,35 @@
           <a:p>
             <a:pPr lvl="0"/>
             <a:r>
-              <a:rPr lang="en-US" smtClean="0"/>
+              <a:rPr lang="en-US"/>
               <a:t>Click to edit Master text styles</a:t>
             </a:r>
           </a:p>
           <a:p>
             <a:pPr lvl="1"/>
             <a:r>
-              <a:rPr lang="en-US" smtClean="0"/>
+              <a:rPr lang="en-US"/>
               <a:t>Second level</a:t>
             </a:r>
           </a:p>
           <a:p>
             <a:pPr lvl="2"/>
             <a:r>
-              <a:rPr lang="en-US" smtClean="0"/>
+              <a:rPr lang="en-US"/>
               <a:t>Third level</a:t>
             </a:r>
           </a:p>
           <a:p>
             <a:pPr lvl="3"/>
             <a:r>
-              <a:rPr lang="en-US" smtClean="0"/>
+              <a:rPr lang="en-US"/>
               <a:t>Fourth level</a:t>
             </a:r>
           </a:p>
           <a:p>
             <a:pPr lvl="4"/>
             <a:r>
-              <a:rPr lang="en-US" smtClean="0"/>
+              <a:rPr lang="en-US"/>
               <a:t>Fifth level</a:t>
             </a:r>
             <a:endParaRPr lang="en-US" dirty="0"/>
@@ -5586,7 +5588,7 @@
           <a:p>
             <a:fld id="{D2BF41B4-1A6C-4616-8220-02F5A017155F}" type="datetimeFigureOut">
               <a:rPr lang="en-US" smtClean="0"/>
-              <a:t>7/4/2019</a:t>
+              <a:t>3/31/2021</a:t>
             </a:fld>
             <a:endParaRPr lang="en-US"/>
           </a:p>
@@ -6130,10 +6132,9 @@
           <a:lstStyle/>
           <a:p>
             <a:r>
-              <a:rPr lang="en-US" dirty="0" smtClean="0"/>
+              <a:rPr lang="en-US" dirty="0"/>
               <a:t>This is testing presentation</a:t>
             </a:r>
-            <a:endParaRPr lang="en-US" dirty="0"/>
           </a:p>
         </p:txBody>
       </p:sp>
@@ -6153,10 +6154,9 @@
           <a:lstStyle/>
           <a:p>
             <a:r>
-              <a:rPr lang="en-US" dirty="0" smtClean="0"/>
+              <a:rPr lang="en-US" dirty="0"/>
               <a:t>Jan Blaha</a:t>
             </a:r>
-            <a:endParaRPr lang="en-US" dirty="0"/>
           </a:p>
         </p:txBody>
       </p:sp>
@@ -6182,13 +6182,6 @@
       </p:transition>
     </mc:Fallback>
   </mc:AlternateContent>
-  <p:timing>
-    <p:tnLst>
-      <p:par>
-        <p:cTn id="1" dur="indefinite" restart="never" nodeType="tmRoot"/>
-      </p:par>
-    </p:tnLst>
-  </p:timing>
 </p:sld>
 </file>
 
@@ -6225,10 +6218,9 @@
           <a:lstStyle/>
           <a:p>
             <a:r>
-              <a:rPr lang="en-US" dirty="0" smtClean="0"/>
+              <a:rPr lang="en-US" dirty="0"/>
               <a:t>{{hello}}</a:t>
             </a:r>
-            <a:endParaRPr lang="en-US" dirty="0"/>
           </a:p>
         </p:txBody>
       </p:sp>
@@ -6254,7 +6246,7 @@
               <a:buAutoNum type="arabicPeriod"/>
             </a:pPr>
             <a:r>
-              <a:rPr lang="en-US" dirty="0" smtClean="0"/>
+              <a:rPr lang="en-US" dirty="0"/>
               <a:t>List item 1</a:t>
             </a:r>
           </a:p>
@@ -6264,7 +6256,7 @@
               <a:buAutoNum type="arabicPeriod"/>
             </a:pPr>
             <a:r>
-              <a:rPr lang="en-US" dirty="0" smtClean="0"/>
+              <a:rPr lang="en-US" dirty="0"/>
               <a:t>List Item 2</a:t>
             </a:r>
           </a:p>
@@ -6274,10 +6266,9 @@
               <a:buAutoNum type="arabicPeriod"/>
             </a:pPr>
             <a:r>
-              <a:rPr lang="en-US" dirty="0" smtClean="0"/>
+              <a:rPr lang="en-US" dirty="0"/>
               <a:t>List item 3</a:t>
             </a:r>
-            <a:endParaRPr lang="en-US" dirty="0"/>
           </a:p>
         </p:txBody>
       </p:sp>
@@ -6304,26 +6295,17 @@
           <a:lstStyle/>
           <a:p>
             <a:r>
-              <a:rPr lang="en-US" dirty="0" smtClean="0"/>
+              <a:rPr lang="en-US" dirty="0"/>
               <a:t>{{</a:t>
             </a:r>
             <a:r>
-              <a:rPr lang="en-US" dirty="0" err="1" smtClean="0"/>
+              <a:rPr lang="en-US" dirty="0" err="1"/>
               <a:t>pptxSlides</a:t>
             </a:r>
             <a:r>
-              <a:rPr lang="en-US" dirty="0" smtClean="0"/>
-              <a:t> </a:t>
-            </a:r>
-            <a:r>
-              <a:rPr lang="en-US" dirty="0" smtClean="0"/>
-              <a:t>items</a:t>
-            </a:r>
-            <a:r>
-              <a:rPr lang="en-US" dirty="0" smtClean="0"/>
-              <a:t>}}</a:t>
-            </a:r>
-            <a:endParaRPr lang="en-US" dirty="0"/>
+              <a:rPr lang="en-US" dirty="0"/>
+              <a:t> items}}</a:t>
+            </a:r>
           </a:p>
         </p:txBody>
       </p:sp>
@@ -6349,13 +6331,89 @@
       </p:transition>
     </mc:Fallback>
   </mc:AlternateContent>
-  <p:timing>
-    <p:tnLst>
-      <p:par>
-        <p:cTn id="1" dur="indefinite" restart="never" nodeType="tmRoot"/>
-      </p:par>
-    </p:tnLst>
-  </p:timing>
+</p:sld>
+</file>
+
+<file path=ppt/slides/slide3.xml><?xml version="1.0" encoding="utf-8"?>
+<p:sld xmlns:a="http://schemas.openxmlformats.org/drawingml/2006/main" xmlns:r="http://schemas.openxmlformats.org/officeDocument/2006/relationships" xmlns:p="http://schemas.openxmlformats.org/presentationml/2006/main">
+  <p:cSld>
+    <p:spTree>
+      <p:nvGrpSpPr>
+        <p:cNvPr id="1" name=""/>
+        <p:cNvGrpSpPr/>
+        <p:nvPr/>
+      </p:nvGrpSpPr>
+      <p:grpSpPr>
+        <a:xfrm>
+          <a:off x="0" y="0"/>
+          <a:ext cx="0" cy="0"/>
+          <a:chOff x="0" y="0"/>
+          <a:chExt cx="0" cy="0"/>
+        </a:xfrm>
+      </p:grpSpPr>
+      <p:sp>
+        <p:nvSpPr>
+          <p:cNvPr id="2" name="Title 1">
+            <a:extLst>
+              <a:ext uri="{FF2B5EF4-FFF2-40B4-BE49-F238E27FC236}">
+                <a16:creationId xmlns:a16="http://schemas.microsoft.com/office/drawing/2014/main" id="{EE145650-850B-4E4A-A595-E08543E4F2B4}"/>
+              </a:ext>
+            </a:extLst>
+          </p:cNvPr>
+          <p:cNvSpPr>
+            <a:spLocks noGrp="1"/>
+          </p:cNvSpPr>
+          <p:nvPr>
+            <p:ph type="title"/>
+          </p:nvPr>
+        </p:nvSpPr>
+        <p:spPr/>
+        <p:txBody>
+          <a:bodyPr/>
+          <a:lstStyle/>
+          <a:p>
+            <a:r>
+              <a:rPr lang="en-US" dirty="0"/>
+              <a:t>Some footer</a:t>
+            </a:r>
+          </a:p>
+        </p:txBody>
+      </p:sp>
+      <p:sp>
+        <p:nvSpPr>
+          <p:cNvPr id="3" name="Text Placeholder 2">
+            <a:extLst>
+              <a:ext uri="{FF2B5EF4-FFF2-40B4-BE49-F238E27FC236}">
+                <a16:creationId xmlns:a16="http://schemas.microsoft.com/office/drawing/2014/main" id="{C455DF34-7A4A-4232-ADEA-310582558F8A}"/>
+              </a:ext>
+            </a:extLst>
+          </p:cNvPr>
+          <p:cNvSpPr>
+            <a:spLocks noGrp="1"/>
+          </p:cNvSpPr>
+          <p:nvPr>
+            <p:ph type="body" sz="half" idx="2"/>
+          </p:nvPr>
+        </p:nvSpPr>
+        <p:spPr/>
+        <p:txBody>
+          <a:bodyPr/>
+          <a:lstStyle/>
+          <a:p>
+            <a:endParaRPr lang="en-US"/>
+          </a:p>
+        </p:txBody>
+      </p:sp>
+    </p:spTree>
+    <p:extLst>
+      <p:ext uri="{BB962C8B-B14F-4D97-AF65-F5344CB8AC3E}">
+        <p14:creationId xmlns:p14="http://schemas.microsoft.com/office/powerpoint/2010/main" val="58988257"/>
+      </p:ext>
+    </p:extLst>
+  </p:cSld>
+  <p:clrMapOvr>
+    <a:masterClrMapping/>
+  </p:clrMapOvr>
 </p:sld>
 </file>
 

</xml_diff>